<commit_message>
Add Openoffice and PDF presentation files
</commit_message>
<xml_diff>
--- a/documentation/Notiz-App.pptx
+++ b/documentation/Notiz-App.pptx
@@ -20200,13 +20200,8 @@
             <a:pPr rtl="0"/>
             <a:r>
               <a:rPr lang="de-DE" dirty="0"/>
-              <a:t>          Datenbank - </a:t>
-            </a:r>
-            <a:r>
-              <a:rPr lang="de-DE" dirty="0" err="1"/>
-              <a:t>Postgres</a:t>
-            </a:r>
-            <a:endParaRPr lang="de-DE" dirty="0"/>
+              <a:t>          Datenbank - PostgreSQL</a:t>
+            </a:r>
           </a:p>
         </p:txBody>
       </p:sp>
@@ -21168,6 +21163,180 @@
           </a:lstStyle>
           <a:p>
             <a:endParaRPr lang="de-DE" sz="2400" dirty="0"/>
+          </a:p>
+        </p:txBody>
+      </p:sp>
+      <p:sp>
+        <p:nvSpPr>
+          <p:cNvPr id="6" name="Textfeld 5">
+            <a:extLst>
+              <a:ext uri="{FF2B5EF4-FFF2-40B4-BE49-F238E27FC236}">
+                <a16:creationId xmlns:a16="http://schemas.microsoft.com/office/drawing/2014/main" id="{862EA967-77E1-F33A-0FED-CC3D5BAE6C90}"/>
+              </a:ext>
+            </a:extLst>
+          </p:cNvPr>
+          <p:cNvSpPr txBox="1"/>
+          <p:nvPr/>
+        </p:nvSpPr>
+        <p:spPr>
+          <a:xfrm>
+            <a:off x="5399267" y="2810805"/>
+            <a:ext cx="3436219" cy="369332"/>
+          </a:xfrm>
+          <a:prstGeom prst="rect">
+            <a:avLst/>
+          </a:prstGeom>
+          <a:noFill/>
+        </p:spPr>
+        <p:txBody>
+          <a:bodyPr wrap="square" rtlCol="0">
+            <a:spAutoFit/>
+          </a:bodyPr>
+          <a:lstStyle/>
+          <a:p>
+            <a:pPr marL="285750" indent="-285750">
+              <a:buFont typeface="Arial" panose="020B0604020202020204" pitchFamily="34" charset="0"/>
+              <a:buChar char="•"/>
+            </a:pPr>
+            <a:r>
+              <a:rPr lang="de-DE" dirty="0"/>
+              <a:t>Integritätsschutz </a:t>
+            </a:r>
+          </a:p>
+        </p:txBody>
+      </p:sp>
+      <p:sp>
+        <p:nvSpPr>
+          <p:cNvPr id="12" name="Textfeld 11">
+            <a:extLst>
+              <a:ext uri="{FF2B5EF4-FFF2-40B4-BE49-F238E27FC236}">
+                <a16:creationId xmlns:a16="http://schemas.microsoft.com/office/drawing/2014/main" id="{789F55D1-4A6E-FCA4-76A2-E40433D9E820}"/>
+              </a:ext>
+            </a:extLst>
+          </p:cNvPr>
+          <p:cNvSpPr txBox="1"/>
+          <p:nvPr/>
+        </p:nvSpPr>
+        <p:spPr>
+          <a:xfrm>
+            <a:off x="1480686" y="2914851"/>
+            <a:ext cx="3436219" cy="923330"/>
+          </a:xfrm>
+          <a:prstGeom prst="rect">
+            <a:avLst/>
+          </a:prstGeom>
+          <a:noFill/>
+        </p:spPr>
+        <p:txBody>
+          <a:bodyPr wrap="square" rtlCol="0">
+            <a:spAutoFit/>
+          </a:bodyPr>
+          <a:lstStyle/>
+          <a:p>
+            <a:pPr marL="285750" indent="-285750">
+              <a:buFont typeface="Arial" panose="020B0604020202020204" pitchFamily="34" charset="0"/>
+              <a:buChar char="•"/>
+            </a:pPr>
+            <a:r>
+              <a:rPr lang="de-DE" dirty="0"/>
+              <a:t>Objektrelational</a:t>
+            </a:r>
+          </a:p>
+          <a:p>
+            <a:pPr marL="285750" indent="-285750">
+              <a:buFont typeface="Arial" panose="020B0604020202020204" pitchFamily="34" charset="0"/>
+              <a:buChar char="•"/>
+            </a:pPr>
+            <a:r>
+              <a:rPr lang="de-DE" dirty="0"/>
+              <a:t>Schlanker als </a:t>
+            </a:r>
+            <a:r>
+              <a:rPr lang="de-DE" dirty="0" err="1"/>
+              <a:t>zB</a:t>
+            </a:r>
+            <a:r>
+              <a:rPr lang="de-DE" dirty="0"/>
+              <a:t> Orakle</a:t>
+            </a:r>
+          </a:p>
+          <a:p>
+            <a:pPr marL="285750" indent="-285750">
+              <a:buFont typeface="Arial" panose="020B0604020202020204" pitchFamily="34" charset="0"/>
+              <a:buChar char="•"/>
+            </a:pPr>
+            <a:r>
+              <a:rPr lang="de-DE" dirty="0" err="1"/>
+              <a:t>OpenSource</a:t>
+            </a:r>
+            <a:r>
+              <a:rPr lang="de-DE" dirty="0"/>
+              <a:t> </a:t>
+            </a:r>
+          </a:p>
+        </p:txBody>
+      </p:sp>
+      <p:sp>
+        <p:nvSpPr>
+          <p:cNvPr id="7" name="Rechteck: abgerundete Ecken 6">
+            <a:extLst>
+              <a:ext uri="{FF2B5EF4-FFF2-40B4-BE49-F238E27FC236}">
+                <a16:creationId xmlns:a16="http://schemas.microsoft.com/office/drawing/2014/main" id="{3F4C4D9D-620B-858C-C423-7C5F32C5D524}"/>
+              </a:ext>
+            </a:extLst>
+          </p:cNvPr>
+          <p:cNvSpPr/>
+          <p:nvPr/>
+        </p:nvSpPr>
+        <p:spPr>
+          <a:xfrm>
+            <a:off x="5129865" y="4456497"/>
+            <a:ext cx="3202469" cy="1501786"/>
+          </a:xfrm>
+          <a:prstGeom prst="roundRect">
+            <a:avLst/>
+          </a:prstGeom>
+        </p:spPr>
+        <p:style>
+          <a:lnRef idx="2">
+            <a:schemeClr val="accent1">
+              <a:shade val="50000"/>
+            </a:schemeClr>
+          </a:lnRef>
+          <a:fillRef idx="1">
+            <a:schemeClr val="accent1"/>
+          </a:fillRef>
+          <a:effectRef idx="0">
+            <a:schemeClr val="accent1"/>
+          </a:effectRef>
+          <a:fontRef idx="minor">
+            <a:schemeClr val="lt1"/>
+          </a:fontRef>
+        </p:style>
+        <p:txBody>
+          <a:bodyPr rtlCol="0" anchor="ctr"/>
+          <a:lstStyle/>
+          <a:p>
+            <a:pPr algn="ctr"/>
+            <a:r>
+              <a:rPr lang="de-DE" dirty="0"/>
+              <a:t>Ein </a:t>
+            </a:r>
+            <a:r>
+              <a:rPr lang="de-DE" dirty="0" err="1"/>
+              <a:t>weitererführender</a:t>
+            </a:r>
+            <a:r>
+              <a:rPr lang="de-DE" dirty="0"/>
+              <a:t> Faktor:</a:t>
+            </a:r>
+          </a:p>
+          <a:p>
+            <a:pPr algn="ctr"/>
+            <a:r>
+              <a:rPr lang="de-DE" dirty="0"/>
+              <a:t>Backups</a:t>
+            </a:r>
           </a:p>
         </p:txBody>
       </p:sp>
@@ -29674,22 +29843,12 @@
 </file>
 
 <file path=customXml/item1.xml><?xml version="1.0" encoding="utf-8"?>
-<p:properties xmlns:p="http://schemas.microsoft.com/office/2006/metadata/properties" xmlns:xsi="http://www.w3.org/2001/XMLSchema-instance" xmlns:pc="http://schemas.microsoft.com/office/infopath/2007/PartnerControls">
-  <documentManagement>
-    <_ip_UnifiedCompliancePolicyUIAction xmlns="http://schemas.microsoft.com/sharepoint/v3" xsi:nil="true"/>
-    <Image xmlns="71af3243-3dd4-4a8d-8c0d-dd76da1f02a5">
-      <Url xsi:nil="true"/>
-      <Description xsi:nil="true"/>
-    </Image>
-    <Status xmlns="71af3243-3dd4-4a8d-8c0d-dd76da1f02a5">Not started</Status>
-    <_ip_UnifiedCompliancePolicyProperties xmlns="http://schemas.microsoft.com/sharepoint/v3" xsi:nil="true"/>
-    <ImageTagsTaxHTField xmlns="71af3243-3dd4-4a8d-8c0d-dd76da1f02a5">
-      <Terms xmlns="http://schemas.microsoft.com/office/infopath/2007/PartnerControls"/>
-    </ImageTagsTaxHTField>
-    <TaxCatchAll xmlns="230e9df3-be65-4c73-a93b-d1236ebd677e"/>
-    <MediaServiceKeyPoints xmlns="71af3243-3dd4-4a8d-8c0d-dd76da1f02a5" xsi:nil="true"/>
-  </documentManagement>
-</p:properties>
+<?mso-contentType ?>
+<FormTemplates xmlns="http://schemas.microsoft.com/sharepoint/v3/contenttype/forms">
+  <Display>DocumentLibraryForm</Display>
+  <Edit>DocumentLibraryForm</Edit>
+  <New>DocumentLibraryForm</New>
+</FormTemplates>
 </file>
 
 <file path=customXml/item2.xml><?xml version="1.0" encoding="utf-8"?>
@@ -29975,29 +30134,28 @@
 </file>
 
 <file path=customXml/item3.xml><?xml version="1.0" encoding="utf-8"?>
-<?mso-contentType ?>
-<FormTemplates xmlns="http://schemas.microsoft.com/sharepoint/v3/contenttype/forms">
-  <Display>DocumentLibraryForm</Display>
-  <Edit>DocumentLibraryForm</Edit>
-  <New>DocumentLibraryForm</New>
-</FormTemplates>
+<p:properties xmlns:p="http://schemas.microsoft.com/office/2006/metadata/properties" xmlns:xsi="http://www.w3.org/2001/XMLSchema-instance" xmlns:pc="http://schemas.microsoft.com/office/infopath/2007/PartnerControls">
+  <documentManagement>
+    <_ip_UnifiedCompliancePolicyUIAction xmlns="http://schemas.microsoft.com/sharepoint/v3" xsi:nil="true"/>
+    <Image xmlns="71af3243-3dd4-4a8d-8c0d-dd76da1f02a5">
+      <Url xsi:nil="true"/>
+      <Description xsi:nil="true"/>
+    </Image>
+    <Status xmlns="71af3243-3dd4-4a8d-8c0d-dd76da1f02a5">Not started</Status>
+    <_ip_UnifiedCompliancePolicyProperties xmlns="http://schemas.microsoft.com/sharepoint/v3" xsi:nil="true"/>
+    <ImageTagsTaxHTField xmlns="71af3243-3dd4-4a8d-8c0d-dd76da1f02a5">
+      <Terms xmlns="http://schemas.microsoft.com/office/infopath/2007/PartnerControls"/>
+    </ImageTagsTaxHTField>
+    <TaxCatchAll xmlns="230e9df3-be65-4c73-a93b-d1236ebd677e"/>
+    <MediaServiceKeyPoints xmlns="71af3243-3dd4-4a8d-8c0d-dd76da1f02a5" xsi:nil="true"/>
+  </documentManagement>
+</p:properties>
 </file>
 
 <file path=customXml/itemProps1.xml><?xml version="1.0" encoding="utf-8"?>
-<ds:datastoreItem xmlns:ds="http://schemas.openxmlformats.org/officeDocument/2006/customXml" ds:itemID="{4D5BAB77-79E1-4739-AA51-10C9079186D6}">
+<ds:datastoreItem xmlns:ds="http://schemas.openxmlformats.org/officeDocument/2006/customXml" ds:itemID="{85334180-0405-413B-834A-44FA9E05ADB7}">
   <ds:schemaRefs>
-    <ds:schemaRef ds:uri="http://schemas.microsoft.com/sharepoint/v3"/>
-    <ds:schemaRef ds:uri="http://schemas.microsoft.com/office/2006/documentManagement/types"/>
-    <ds:schemaRef ds:uri="http://www.w3.org/XML/1998/namespace"/>
-    <ds:schemaRef ds:uri="230e9df3-be65-4c73-a93b-d1236ebd677e"/>
-    <ds:schemaRef ds:uri="71af3243-3dd4-4a8d-8c0d-dd76da1f02a5"/>
-    <ds:schemaRef ds:uri="http://schemas.microsoft.com/office/infopath/2007/PartnerControls"/>
-    <ds:schemaRef ds:uri="http://purl.org/dc/elements/1.1/"/>
-    <ds:schemaRef ds:uri="http://purl.org/dc/dcmitype/"/>
-    <ds:schemaRef ds:uri="http://schemas.openxmlformats.org/package/2006/metadata/core-properties"/>
-    <ds:schemaRef ds:uri="16c05727-aa75-4e4a-9b5f-8a80a1165891"/>
-    <ds:schemaRef ds:uri="http://schemas.microsoft.com/office/2006/metadata/properties"/>
-    <ds:schemaRef ds:uri="http://purl.org/dc/terms/"/>
+    <ds:schemaRef ds:uri="http://schemas.microsoft.com/sharepoint/v3/contenttype/forms"/>
   </ds:schemaRefs>
 </ds:datastoreItem>
 </file>
@@ -30024,9 +30182,20 @@
 </file>
 
 <file path=customXml/itemProps3.xml><?xml version="1.0" encoding="utf-8"?>
-<ds:datastoreItem xmlns:ds="http://schemas.openxmlformats.org/officeDocument/2006/customXml" ds:itemID="{85334180-0405-413B-834A-44FA9E05ADB7}">
+<ds:datastoreItem xmlns:ds="http://schemas.openxmlformats.org/officeDocument/2006/customXml" ds:itemID="{4D5BAB77-79E1-4739-AA51-10C9079186D6}">
   <ds:schemaRefs>
-    <ds:schemaRef ds:uri="http://schemas.microsoft.com/sharepoint/v3/contenttype/forms"/>
+    <ds:schemaRef ds:uri="http://schemas.microsoft.com/sharepoint/v3"/>
+    <ds:schemaRef ds:uri="http://schemas.microsoft.com/office/2006/documentManagement/types"/>
+    <ds:schemaRef ds:uri="http://www.w3.org/XML/1998/namespace"/>
+    <ds:schemaRef ds:uri="230e9df3-be65-4c73-a93b-d1236ebd677e"/>
+    <ds:schemaRef ds:uri="71af3243-3dd4-4a8d-8c0d-dd76da1f02a5"/>
+    <ds:schemaRef ds:uri="http://schemas.microsoft.com/office/infopath/2007/PartnerControls"/>
+    <ds:schemaRef ds:uri="http://purl.org/dc/elements/1.1/"/>
+    <ds:schemaRef ds:uri="http://purl.org/dc/dcmitype/"/>
+    <ds:schemaRef ds:uri="http://schemas.openxmlformats.org/package/2006/metadata/core-properties"/>
+    <ds:schemaRef ds:uri="16c05727-aa75-4e4a-9b5f-8a80a1165891"/>
+    <ds:schemaRef ds:uri="http://schemas.microsoft.com/office/2006/metadata/properties"/>
+    <ds:schemaRef ds:uri="http://purl.org/dc/terms/"/>
   </ds:schemaRefs>
 </ds:datastoreItem>
 </file>

</xml_diff>